<commit_message>
update in doc and added default ValidationConfiguration
</commit_message>
<xml_diff>
--- a/src/main/resources/Documentation/UserDocs/app/Accessing GVT as a Guest User.pptx
+++ b/src/main/resources/Documentation/UserDocs/app/Accessing GVT as a Guest User.pptx
@@ -141,6 +141,67 @@
 </p:cmAuthorLst>
 </file>
 
+<file path=ppt/revisionInfo.xml><?xml version="1.0" encoding="utf-8"?>
+<p1510:revInfo xmlns:a="http://schemas.openxmlformats.org/drawingml/2006/main" xmlns:r="http://schemas.openxmlformats.org/officeDocument/2006/relationships" xmlns:p1510="http://schemas.microsoft.com/office/powerpoint/2015/10/main">
+  <p1510:revLst>
+    <p1510:client id="{E5B2127D-963E-4534-AD3B-9249D9D3E10E}" v="10" dt="2019-04-10T15:02:15.294"/>
+  </p1510:revLst>
+</p1510:revInfo>
+</file>
+
+<file path=ppt/changesInfos/changesInfo1.xml><?xml version="1.0" encoding="utf-8"?>
+<pc:chgInfo xmlns:a="http://schemas.openxmlformats.org/drawingml/2006/main" xmlns:r="http://schemas.openxmlformats.org/officeDocument/2006/relationships" xmlns:ac="http://schemas.microsoft.com/office/drawing/2013/main/command" xmlns:pc="http://schemas.microsoft.com/office/powerpoint/2013/main/command">
+  <pc:docChgLst>
+    <pc:chgData name="Martinez, Sandra (Fed)" userId="4d3d0ce3547d3a6e" providerId="OrgId" clId="{E5B2127D-963E-4534-AD3B-9249D9D3E10E}"/>
+    <pc:docChg chg="modSld">
+      <pc:chgData name="Martinez, Sandra (Fed)" userId="4d3d0ce3547d3a6e" providerId="OrgId" clId="{E5B2127D-963E-4534-AD3B-9249D9D3E10E}" dt="2019-04-10T15:02:15.294" v="9" actId="1076"/>
+      <pc:docMkLst>
+        <pc:docMk/>
+      </pc:docMkLst>
+      <pc:sldChg chg="addSp delSp modSp">
+        <pc:chgData name="Martinez, Sandra (Fed)" userId="4d3d0ce3547d3a6e" providerId="OrgId" clId="{E5B2127D-963E-4534-AD3B-9249D9D3E10E}" dt="2019-04-10T15:02:15.294" v="9" actId="1076"/>
+        <pc:sldMkLst>
+          <pc:docMk/>
+          <pc:sldMk cId="3138351700" sldId="317"/>
+        </pc:sldMkLst>
+        <pc:picChg chg="add mod">
+          <ac:chgData name="Martinez, Sandra (Fed)" userId="4d3d0ce3547d3a6e" providerId="OrgId" clId="{E5B2127D-963E-4534-AD3B-9249D9D3E10E}" dt="2019-04-10T15:02:15.294" v="9" actId="1076"/>
+          <ac:picMkLst>
+            <pc:docMk/>
+            <pc:sldMk cId="3138351700" sldId="317"/>
+            <ac:picMk id="2" creationId="{3C402FE0-1C00-4D8E-A89B-98C696308883}"/>
+          </ac:picMkLst>
+        </pc:picChg>
+        <pc:picChg chg="add del">
+          <ac:chgData name="Martinez, Sandra (Fed)" userId="4d3d0ce3547d3a6e" providerId="OrgId" clId="{E5B2127D-963E-4534-AD3B-9249D9D3E10E}" dt="2019-04-10T14:58:36.350" v="1"/>
+          <ac:picMkLst>
+            <pc:docMk/>
+            <pc:sldMk cId="3138351700" sldId="317"/>
+            <ac:picMk id="2" creationId="{E597F5D4-1D4D-4DCF-8BCC-CC44A483BC3B}"/>
+          </ac:picMkLst>
+        </pc:picChg>
+        <pc:cxnChg chg="mod">
+          <ac:chgData name="Martinez, Sandra (Fed)" userId="4d3d0ce3547d3a6e" providerId="OrgId" clId="{E5B2127D-963E-4534-AD3B-9249D9D3E10E}" dt="2019-04-10T15:02:00.312" v="8" actId="14100"/>
+          <ac:cxnSpMkLst>
+            <pc:docMk/>
+            <pc:sldMk cId="3138351700" sldId="317"/>
+            <ac:cxnSpMk id="12" creationId="{B24B6A92-9A93-4DE1-BD21-6CD3B379E321}"/>
+          </ac:cxnSpMkLst>
+        </pc:cxnChg>
+        <pc:cxnChg chg="mod">
+          <ac:chgData name="Martinez, Sandra (Fed)" userId="4d3d0ce3547d3a6e" providerId="OrgId" clId="{E5B2127D-963E-4534-AD3B-9249D9D3E10E}" dt="2019-04-10T15:01:47.666" v="6" actId="1076"/>
+          <ac:cxnSpMkLst>
+            <pc:docMk/>
+            <pc:sldMk cId="3138351700" sldId="317"/>
+            <ac:cxnSpMk id="26" creationId="{625A4FC0-6A0A-41C3-9564-01551A738AAC}"/>
+          </ac:cxnSpMkLst>
+        </pc:cxnChg>
+      </pc:sldChg>
+    </pc:docChg>
+  </pc:docChgLst>
+</pc:chgInfo>
+</file>
+
 <file path=ppt/notesMasters/notesMaster1.xml><?xml version="1.0" encoding="utf-8"?>
 <p:notesMaster xmlns:a="http://schemas.openxmlformats.org/drawingml/2006/main" xmlns:r="http://schemas.openxmlformats.org/officeDocument/2006/relationships" xmlns:p="http://schemas.openxmlformats.org/presentationml/2006/main">
   <p:cSld>
@@ -223,7 +284,7 @@
           <a:p>
             <a:fld id="{9D756F37-617F-4B1C-BED3-CE7228747FF6}" type="datetimeFigureOut">
               <a:rPr lang="en-US" smtClean="0"/>
-              <a:t>8/2/2018</a:t>
+              <a:t>4/10/2019</a:t>
             </a:fld>
             <a:endParaRPr lang="en-US" dirty="0"/>
           </a:p>
@@ -721,7 +782,7 @@
           <a:p>
             <a:fld id="{48C125B5-8C0F-4E23-A011-032AA809F041}" type="datetimeFigureOut">
               <a:rPr lang="en-US" smtClean="0"/>
-              <a:t>8/2/2018</a:t>
+              <a:t>4/10/2019</a:t>
             </a:fld>
             <a:endParaRPr lang="en-US" dirty="0"/>
           </a:p>
@@ -919,7 +980,7 @@
           <a:p>
             <a:fld id="{48C125B5-8C0F-4E23-A011-032AA809F041}" type="datetimeFigureOut">
               <a:rPr lang="en-US" smtClean="0"/>
-              <a:t>8/2/2018</a:t>
+              <a:t>4/10/2019</a:t>
             </a:fld>
             <a:endParaRPr lang="en-US" dirty="0"/>
           </a:p>
@@ -1127,7 +1188,7 @@
           <a:p>
             <a:fld id="{48C125B5-8C0F-4E23-A011-032AA809F041}" type="datetimeFigureOut">
               <a:rPr lang="en-US" smtClean="0"/>
-              <a:t>8/2/2018</a:t>
+              <a:t>4/10/2019</a:t>
             </a:fld>
             <a:endParaRPr lang="en-US" dirty="0"/>
           </a:p>
@@ -1325,7 +1386,7 @@
           <a:p>
             <a:fld id="{48C125B5-8C0F-4E23-A011-032AA809F041}" type="datetimeFigureOut">
               <a:rPr lang="en-US" smtClean="0"/>
-              <a:t>8/2/2018</a:t>
+              <a:t>4/10/2019</a:t>
             </a:fld>
             <a:endParaRPr lang="en-US" dirty="0"/>
           </a:p>
@@ -1600,7 +1661,7 @@
           <a:p>
             <a:fld id="{48C125B5-8C0F-4E23-A011-032AA809F041}" type="datetimeFigureOut">
               <a:rPr lang="en-US" smtClean="0"/>
-              <a:t>8/2/2018</a:t>
+              <a:t>4/10/2019</a:t>
             </a:fld>
             <a:endParaRPr lang="en-US" dirty="0"/>
           </a:p>
@@ -1865,7 +1926,7 @@
           <a:p>
             <a:fld id="{48C125B5-8C0F-4E23-A011-032AA809F041}" type="datetimeFigureOut">
               <a:rPr lang="en-US" smtClean="0"/>
-              <a:t>8/2/2018</a:t>
+              <a:t>4/10/2019</a:t>
             </a:fld>
             <a:endParaRPr lang="en-US" dirty="0"/>
           </a:p>
@@ -2277,7 +2338,7 @@
           <a:p>
             <a:fld id="{48C125B5-8C0F-4E23-A011-032AA809F041}" type="datetimeFigureOut">
               <a:rPr lang="en-US" smtClean="0"/>
-              <a:t>8/2/2018</a:t>
+              <a:t>4/10/2019</a:t>
             </a:fld>
             <a:endParaRPr lang="en-US" dirty="0"/>
           </a:p>
@@ -2418,7 +2479,7 @@
           <a:p>
             <a:fld id="{48C125B5-8C0F-4E23-A011-032AA809F041}" type="datetimeFigureOut">
               <a:rPr lang="en-US" smtClean="0"/>
-              <a:t>8/2/2018</a:t>
+              <a:t>4/10/2019</a:t>
             </a:fld>
             <a:endParaRPr lang="en-US" dirty="0"/>
           </a:p>
@@ -2531,7 +2592,7 @@
           <a:p>
             <a:fld id="{48C125B5-8C0F-4E23-A011-032AA809F041}" type="datetimeFigureOut">
               <a:rPr lang="en-US" smtClean="0"/>
-              <a:t>8/2/2018</a:t>
+              <a:t>4/10/2019</a:t>
             </a:fld>
             <a:endParaRPr lang="en-US" dirty="0"/>
           </a:p>
@@ -2842,7 +2903,7 @@
           <a:p>
             <a:fld id="{48C125B5-8C0F-4E23-A011-032AA809F041}" type="datetimeFigureOut">
               <a:rPr lang="en-US" smtClean="0"/>
-              <a:t>8/2/2018</a:t>
+              <a:t>4/10/2019</a:t>
             </a:fld>
             <a:endParaRPr lang="en-US" dirty="0"/>
           </a:p>
@@ -3130,7 +3191,7 @@
           <a:p>
             <a:fld id="{48C125B5-8C0F-4E23-A011-032AA809F041}" type="datetimeFigureOut">
               <a:rPr lang="en-US" smtClean="0"/>
-              <a:t>8/2/2018</a:t>
+              <a:t>4/10/2019</a:t>
             </a:fld>
             <a:endParaRPr lang="en-US" dirty="0"/>
           </a:p>
@@ -3371,7 +3432,7 @@
           <a:p>
             <a:fld id="{48C125B5-8C0F-4E23-A011-032AA809F041}" type="datetimeFigureOut">
               <a:rPr lang="en-US" smtClean="0"/>
-              <a:t>8/2/2018</a:t>
+              <a:t>4/10/2019</a:t>
             </a:fld>
             <a:endParaRPr lang="en-US" dirty="0"/>
           </a:p>
@@ -3788,160 +3849,88 @@
           <a:chExt cx="0" cy="0"/>
         </a:xfrm>
       </p:grpSpPr>
-      <p:grpSp>
-        <p:nvGrpSpPr>
-          <p:cNvPr id="36" name="Group 35">
-            <a:extLst>
-              <a:ext uri="{FF2B5EF4-FFF2-40B4-BE49-F238E27FC236}">
-                <a16:creationId xmlns:a16="http://schemas.microsoft.com/office/drawing/2014/main" id="{19C3111D-EEF6-4B19-9FF3-A67CF291E573}"/>
-              </a:ext>
-            </a:extLst>
-          </p:cNvPr>
-          <p:cNvGrpSpPr/>
+      <p:pic>
+        <p:nvPicPr>
+          <p:cNvPr id="5" name="Picture 4">
+            <a:extLst>
+              <a:ext uri="{FF2B5EF4-FFF2-40B4-BE49-F238E27FC236}">
+                <a16:creationId xmlns:a16="http://schemas.microsoft.com/office/drawing/2014/main" id="{0627D029-F192-479B-8B60-451702E0D90B}"/>
+              </a:ext>
+            </a:extLst>
+          </p:cNvPr>
+          <p:cNvPicPr>
+            <a:picLocks noChangeAspect="1"/>
+          </p:cNvPicPr>
           <p:nvPr/>
-        </p:nvGrpSpPr>
-        <p:grpSpPr>
+        </p:nvPicPr>
+        <p:blipFill>
+          <a:blip r:embed="rId3"/>
+          <a:stretch>
+            <a:fillRect/>
+          </a:stretch>
+        </p:blipFill>
+        <p:spPr>
           <a:xfrm>
-            <a:off x="536959" y="1374635"/>
-            <a:ext cx="11118082" cy="3844075"/>
-            <a:chOff x="536959" y="1374635"/>
-            <a:chExt cx="11118082" cy="3844075"/>
+            <a:off x="558914" y="1374634"/>
+            <a:ext cx="11127440" cy="4602234"/>
           </a:xfrm>
-        </p:grpSpPr>
-        <p:grpSp>
-          <p:nvGrpSpPr>
-            <p:cNvPr id="2" name="Group 1">
-              <a:extLst>
-                <a:ext uri="{FF2B5EF4-FFF2-40B4-BE49-F238E27FC236}">
-                  <a16:creationId xmlns:a16="http://schemas.microsoft.com/office/drawing/2014/main" id="{945EA140-D182-4D40-B842-145AB2028649}"/>
-                </a:ext>
-              </a:extLst>
-            </p:cNvPr>
-            <p:cNvGrpSpPr/>
-            <p:nvPr/>
-          </p:nvGrpSpPr>
-          <p:grpSpPr>
-            <a:xfrm>
-              <a:off x="536959" y="1374635"/>
-              <a:ext cx="11118082" cy="3844075"/>
-              <a:chOff x="442337" y="1426015"/>
-              <a:chExt cx="11118082" cy="3844075"/>
-            </a:xfrm>
-          </p:grpSpPr>
-          <p:pic>
-            <p:nvPicPr>
-              <p:cNvPr id="7" name="Picture 6">
-                <a:extLst>
-                  <a:ext uri="{FF2B5EF4-FFF2-40B4-BE49-F238E27FC236}">
-                    <a16:creationId xmlns:a16="http://schemas.microsoft.com/office/drawing/2014/main" id="{CEF97071-A256-4FA8-86E7-C06F63B046FA}"/>
-                  </a:ext>
-                </a:extLst>
-              </p:cNvPr>
-              <p:cNvPicPr>
-                <a:picLocks noChangeAspect="1"/>
-              </p:cNvPicPr>
-              <p:nvPr/>
-            </p:nvPicPr>
-            <p:blipFill>
-              <a:blip r:embed="rId3"/>
-              <a:stretch>
-                <a:fillRect/>
-              </a:stretch>
-            </p:blipFill>
-            <p:spPr>
-              <a:xfrm>
-                <a:off x="442429" y="1426015"/>
-                <a:ext cx="11117990" cy="3844075"/>
-              </a:xfrm>
-              <a:prstGeom prst="rect">
-                <a:avLst/>
-              </a:prstGeom>
-            </p:spPr>
-          </p:pic>
-          <p:sp>
-            <p:nvSpPr>
-              <p:cNvPr id="15" name="Rectangle 14">
-                <a:extLst>
-                  <a:ext uri="{FF2B5EF4-FFF2-40B4-BE49-F238E27FC236}">
-                    <a16:creationId xmlns:a16="http://schemas.microsoft.com/office/drawing/2014/main" id="{AE3A65D2-4E44-415B-A435-4ECA7B9A3DE5}"/>
-                  </a:ext>
-                </a:extLst>
-              </p:cNvPr>
-              <p:cNvSpPr/>
-              <p:nvPr/>
-            </p:nvSpPr>
-            <p:spPr>
-              <a:xfrm>
-                <a:off x="442337" y="1426015"/>
-                <a:ext cx="11118082" cy="3844075"/>
-              </a:xfrm>
-              <a:prstGeom prst="rect">
-                <a:avLst/>
-              </a:prstGeom>
-              <a:noFill/>
-              <a:ln w="38100">
-                <a:solidFill>
-                  <a:srgbClr val="C00000"/>
-                </a:solidFill>
-              </a:ln>
-            </p:spPr>
-            <p:style>
-              <a:lnRef idx="2">
-                <a:schemeClr val="accent1">
-                  <a:shade val="50000"/>
-                </a:schemeClr>
-              </a:lnRef>
-              <a:fillRef idx="1">
-                <a:schemeClr val="accent1"/>
-              </a:fillRef>
-              <a:effectRef idx="0">
-                <a:schemeClr val="accent1"/>
-              </a:effectRef>
-              <a:fontRef idx="minor">
-                <a:schemeClr val="lt1"/>
-              </a:fontRef>
-            </p:style>
-            <p:txBody>
-              <a:bodyPr rtlCol="0" anchor="ctr"/>
-              <a:lstStyle/>
-              <a:p>
-                <a:pPr algn="ctr"/>
-                <a:endParaRPr lang="en-US"/>
-              </a:p>
-            </p:txBody>
-          </p:sp>
-        </p:grpSp>
-        <p:pic>
-          <p:nvPicPr>
-            <p:cNvPr id="18" name="Picture 17">
-              <a:extLst>
-                <a:ext uri="{FF2B5EF4-FFF2-40B4-BE49-F238E27FC236}">
-                  <a16:creationId xmlns:a16="http://schemas.microsoft.com/office/drawing/2014/main" id="{1189F069-AF83-4F18-BE0F-B893B92796CC}"/>
-                </a:ext>
-              </a:extLst>
-            </p:cNvPr>
-            <p:cNvPicPr>
-              <a:picLocks noChangeAspect="1"/>
-            </p:cNvPicPr>
-            <p:nvPr/>
-          </p:nvPicPr>
-          <p:blipFill>
-            <a:blip r:embed="rId4"/>
-            <a:stretch>
-              <a:fillRect/>
-            </a:stretch>
-          </p:blipFill>
-          <p:spPr>
-            <a:xfrm>
-              <a:off x="10762141" y="1835675"/>
-              <a:ext cx="851693" cy="855462"/>
-            </a:xfrm>
-            <a:prstGeom prst="rect">
-              <a:avLst/>
-            </a:prstGeom>
-          </p:spPr>
-        </p:pic>
-      </p:grpSp>
+          <a:prstGeom prst="rect">
+            <a:avLst/>
+          </a:prstGeom>
+        </p:spPr>
+      </p:pic>
+      <p:sp>
+        <p:nvSpPr>
+          <p:cNvPr id="15" name="Rectangle 14">
+            <a:extLst>
+              <a:ext uri="{FF2B5EF4-FFF2-40B4-BE49-F238E27FC236}">
+                <a16:creationId xmlns:a16="http://schemas.microsoft.com/office/drawing/2014/main" id="{AE3A65D2-4E44-415B-A435-4ECA7B9A3DE5}"/>
+              </a:ext>
+            </a:extLst>
+          </p:cNvPr>
+          <p:cNvSpPr/>
+          <p:nvPr/>
+        </p:nvSpPr>
+        <p:spPr>
+          <a:xfrm>
+            <a:off x="536958" y="1374635"/>
+            <a:ext cx="11149395" cy="4602233"/>
+          </a:xfrm>
+          <a:prstGeom prst="rect">
+            <a:avLst/>
+          </a:prstGeom>
+          <a:noFill/>
+          <a:ln w="38100">
+            <a:solidFill>
+              <a:srgbClr val="C00000"/>
+            </a:solidFill>
+          </a:ln>
+        </p:spPr>
+        <p:style>
+          <a:lnRef idx="2">
+            <a:schemeClr val="accent1">
+              <a:shade val="50000"/>
+            </a:schemeClr>
+          </a:lnRef>
+          <a:fillRef idx="1">
+            <a:schemeClr val="accent1"/>
+          </a:fillRef>
+          <a:effectRef idx="0">
+            <a:schemeClr val="accent1"/>
+          </a:effectRef>
+          <a:fontRef idx="minor">
+            <a:schemeClr val="lt1"/>
+          </a:fontRef>
+        </p:style>
+        <p:txBody>
+          <a:bodyPr rtlCol="0" anchor="ctr"/>
+          <a:lstStyle/>
+          <a:p>
+            <a:pPr algn="ctr"/>
+            <a:endParaRPr lang="en-US"/>
+          </a:p>
+        </p:txBody>
+      </p:sp>
       <p:sp>
         <p:nvSpPr>
           <p:cNvPr id="3" name="Title 1">
@@ -4033,7 +4022,7 @@
         </p:nvSpPr>
         <p:spPr bwMode="auto">
           <a:xfrm>
-            <a:off x="7722941" y="724461"/>
+            <a:off x="7722941" y="630530"/>
             <a:ext cx="2271808" cy="369332"/>
           </a:xfrm>
           <a:prstGeom prst="rect">
@@ -4480,56 +4469,6 @@
           </a:p>
         </p:txBody>
       </p:sp>
-      <p:cxnSp>
-        <p:nvCxnSpPr>
-          <p:cNvPr id="37" name="Straight Connector 58">
-            <a:extLst>
-              <a:ext uri="{FF2B5EF4-FFF2-40B4-BE49-F238E27FC236}">
-                <a16:creationId xmlns:a16="http://schemas.microsoft.com/office/drawing/2014/main" id="{43A735C8-28B3-4068-B906-C3D9F6BA93D8}"/>
-              </a:ext>
-            </a:extLst>
-          </p:cNvPr>
-          <p:cNvCxnSpPr>
-            <a:cxnSpLocks noChangeShapeType="1"/>
-          </p:cNvCxnSpPr>
-          <p:nvPr/>
-        </p:nvCxnSpPr>
-        <p:spPr bwMode="auto">
-          <a:xfrm>
-            <a:off x="9882748" y="1093793"/>
-            <a:ext cx="0" cy="379779"/>
-          </a:xfrm>
-          <a:prstGeom prst="line">
-            <a:avLst/>
-          </a:prstGeom>
-          <a:noFill/>
-          <a:ln w="28575">
-            <a:solidFill>
-              <a:srgbClr val="7F7F7F"/>
-            </a:solidFill>
-            <a:round/>
-            <a:headEnd/>
-            <a:tailEnd type="oval" w="med" len="med"/>
-          </a:ln>
-          <a:effectLst/>
-          <a:extLst>
-            <a:ext uri="{909E8E84-426E-40DD-AFC4-6F175D3DCCD1}">
-              <a14:hiddenFill xmlns:a14="http://schemas.microsoft.com/office/drawing/2010/main">
-                <a:noFill/>
-              </a14:hiddenFill>
-            </a:ext>
-            <a:ext uri="{AF507438-7753-43E0-B8FC-AC1667EBCBE1}">
-              <a14:hiddenEffects xmlns:a14="http://schemas.microsoft.com/office/drawing/2010/main">
-                <a:effectLst>
-                  <a:outerShdw dist="35921" dir="2700000" algn="ctr" rotWithShape="0">
-                    <a:schemeClr val="bg2"/>
-                  </a:outerShdw>
-                </a:effectLst>
-              </a14:hiddenEffects>
-            </a:ext>
-          </a:extLst>
-        </p:spPr>
-      </p:cxnSp>
       <p:sp>
         <p:nvSpPr>
           <p:cNvPr id="17" name="TextBox 16">
@@ -4787,12 +4726,12 @@
         </p:nvCxnSpPr>
         <p:spPr bwMode="auto">
           <a:xfrm rot="16200000" flipV="1">
-            <a:off x="987776" y="3268858"/>
-            <a:ext cx="4090954" cy="1052051"/>
+            <a:off x="842212" y="3123294"/>
+            <a:ext cx="3946248" cy="1487886"/>
           </a:xfrm>
           <a:prstGeom prst="bentConnector3">
             <a:avLst>
-              <a:gd name="adj1" fmla="val 49039"/>
+              <a:gd name="adj1" fmla="val 49291"/>
             </a:avLst>
           </a:prstGeom>
           <a:solidFill>
@@ -4837,12 +4776,12 @@
         </p:nvCxnSpPr>
         <p:spPr bwMode="auto">
           <a:xfrm rot="16200000" flipV="1">
-            <a:off x="520742" y="2870652"/>
-            <a:ext cx="4159780" cy="1917290"/>
+            <a:off x="689931" y="2527232"/>
+            <a:ext cx="2014578" cy="748343"/>
           </a:xfrm>
           <a:prstGeom prst="bentConnector3">
             <a:avLst>
-              <a:gd name="adj1" fmla="val 50000"/>
+              <a:gd name="adj1" fmla="val 442"/>
             </a:avLst>
           </a:prstGeom>
           <a:solidFill>
@@ -4886,13 +4825,13 @@
           <p:nvPr/>
         </p:nvCxnSpPr>
         <p:spPr bwMode="auto">
-          <a:xfrm rot="5400000" flipH="1" flipV="1">
-            <a:off x="1258906" y="3853133"/>
-            <a:ext cx="4602233" cy="394781"/>
+          <a:xfrm rot="16200000" flipV="1">
+            <a:off x="1024986" y="3675132"/>
+            <a:ext cx="4478696" cy="897996"/>
           </a:xfrm>
           <a:prstGeom prst="bentConnector3">
             <a:avLst>
-              <a:gd name="adj1" fmla="val -206"/>
+              <a:gd name="adj1" fmla="val 59167"/>
             </a:avLst>
           </a:prstGeom>
           <a:solidFill>
@@ -5122,8 +5061,8 @@
         </p:nvCxnSpPr>
         <p:spPr bwMode="auto">
           <a:xfrm>
-            <a:off x="11406192" y="1093793"/>
-            <a:ext cx="0" cy="379779"/>
+            <a:off x="11602143" y="1093793"/>
+            <a:ext cx="0" cy="333124"/>
           </a:xfrm>
           <a:prstGeom prst="line">
             <a:avLst/>
@@ -5172,12 +5111,12 @@
         </p:nvCxnSpPr>
         <p:spPr bwMode="auto">
           <a:xfrm rot="5400000" flipH="1" flipV="1">
-            <a:off x="7838864" y="2621923"/>
-            <a:ext cx="3597658" cy="1852624"/>
+            <a:off x="8699698" y="3111356"/>
+            <a:ext cx="3526127" cy="945290"/>
           </a:xfrm>
           <a:prstGeom prst="bentConnector3">
             <a:avLst>
-              <a:gd name="adj1" fmla="val 100013"/>
+              <a:gd name="adj1" fmla="val 100012"/>
             </a:avLst>
           </a:prstGeom>
           <a:solidFill>
@@ -5206,6 +5145,220 @@
           </a:extLst>
         </p:spPr>
       </p:cxnSp>
+      <p:cxnSp>
+        <p:nvCxnSpPr>
+          <p:cNvPr id="12" name="Straight Connector 11">
+            <a:extLst>
+              <a:ext uri="{FF2B5EF4-FFF2-40B4-BE49-F238E27FC236}">
+                <a16:creationId xmlns:a16="http://schemas.microsoft.com/office/drawing/2014/main" id="{B24B6A92-9A93-4DE1-BD21-6CD3B379E321}"/>
+              </a:ext>
+            </a:extLst>
+          </p:cNvPr>
+          <p:cNvCxnSpPr>
+            <a:cxnSpLocks/>
+          </p:cNvCxnSpPr>
+          <p:nvPr/>
+        </p:nvCxnSpPr>
+        <p:spPr>
+          <a:xfrm>
+            <a:off x="8868176" y="1194318"/>
+            <a:ext cx="2127721" cy="0"/>
+          </a:xfrm>
+          <a:prstGeom prst="line">
+            <a:avLst/>
+          </a:prstGeom>
+          <a:ln w="38100">
+            <a:solidFill>
+              <a:schemeClr val="bg1">
+                <a:lumMod val="50000"/>
+              </a:schemeClr>
+            </a:solidFill>
+          </a:ln>
+        </p:spPr>
+        <p:style>
+          <a:lnRef idx="1">
+            <a:schemeClr val="accent1"/>
+          </a:lnRef>
+          <a:fillRef idx="0">
+            <a:schemeClr val="accent1"/>
+          </a:fillRef>
+          <a:effectRef idx="0">
+            <a:schemeClr val="accent1"/>
+          </a:effectRef>
+          <a:fontRef idx="minor">
+            <a:schemeClr val="tx1"/>
+          </a:fontRef>
+        </p:style>
+      </p:cxnSp>
+      <p:cxnSp>
+        <p:nvCxnSpPr>
+          <p:cNvPr id="26" name="Straight Connector 58">
+            <a:extLst>
+              <a:ext uri="{FF2B5EF4-FFF2-40B4-BE49-F238E27FC236}">
+                <a16:creationId xmlns:a16="http://schemas.microsoft.com/office/drawing/2014/main" id="{625A4FC0-6A0A-41C3-9564-01551A738AAC}"/>
+              </a:ext>
+            </a:extLst>
+          </p:cNvPr>
+          <p:cNvCxnSpPr>
+            <a:cxnSpLocks noChangeShapeType="1"/>
+          </p:cNvCxnSpPr>
+          <p:nvPr/>
+        </p:nvCxnSpPr>
+        <p:spPr bwMode="auto">
+          <a:xfrm>
+            <a:off x="10995897" y="1194318"/>
+            <a:ext cx="0" cy="294725"/>
+          </a:xfrm>
+          <a:prstGeom prst="line">
+            <a:avLst/>
+          </a:prstGeom>
+          <a:noFill/>
+          <a:ln w="28575">
+            <a:solidFill>
+              <a:srgbClr val="7F7F7F"/>
+            </a:solidFill>
+            <a:round/>
+            <a:headEnd/>
+            <a:tailEnd type="oval" w="med" len="med"/>
+          </a:ln>
+          <a:effectLst/>
+          <a:extLst>
+            <a:ext uri="{909E8E84-426E-40DD-AFC4-6F175D3DCCD1}">
+              <a14:hiddenFill xmlns:a14="http://schemas.microsoft.com/office/drawing/2010/main">
+                <a:noFill/>
+              </a14:hiddenFill>
+            </a:ext>
+            <a:ext uri="{AF507438-7753-43E0-B8FC-AC1667EBCBE1}">
+              <a14:hiddenEffects xmlns:a14="http://schemas.microsoft.com/office/drawing/2010/main">
+                <a:effectLst>
+                  <a:outerShdw dist="35921" dir="2700000" algn="ctr" rotWithShape="0">
+                    <a:schemeClr val="bg2"/>
+                  </a:outerShdw>
+                </a:effectLst>
+              </a14:hiddenEffects>
+            </a:ext>
+          </a:extLst>
+        </p:spPr>
+      </p:cxnSp>
+      <p:cxnSp>
+        <p:nvCxnSpPr>
+          <p:cNvPr id="29" name="Straight Connector 28">
+            <a:extLst>
+              <a:ext uri="{FF2B5EF4-FFF2-40B4-BE49-F238E27FC236}">
+                <a16:creationId xmlns:a16="http://schemas.microsoft.com/office/drawing/2014/main" id="{ECC32E6E-89B9-41D6-A50F-F9BB18CF50A4}"/>
+              </a:ext>
+            </a:extLst>
+          </p:cNvPr>
+          <p:cNvCxnSpPr>
+            <a:cxnSpLocks/>
+          </p:cNvCxnSpPr>
+          <p:nvPr/>
+        </p:nvCxnSpPr>
+        <p:spPr>
+          <a:xfrm flipV="1">
+            <a:off x="8877507" y="1009193"/>
+            <a:ext cx="0" cy="194458"/>
+          </a:xfrm>
+          <a:prstGeom prst="line">
+            <a:avLst/>
+          </a:prstGeom>
+          <a:ln w="38100">
+            <a:solidFill>
+              <a:schemeClr val="bg1">
+                <a:lumMod val="50000"/>
+              </a:schemeClr>
+            </a:solidFill>
+          </a:ln>
+        </p:spPr>
+        <p:style>
+          <a:lnRef idx="1">
+            <a:schemeClr val="accent1"/>
+          </a:lnRef>
+          <a:fillRef idx="0">
+            <a:schemeClr val="accent1"/>
+          </a:fillRef>
+          <a:effectRef idx="0">
+            <a:schemeClr val="accent1"/>
+          </a:effectRef>
+          <a:fontRef idx="minor">
+            <a:schemeClr val="tx1"/>
+          </a:fontRef>
+        </p:style>
+      </p:cxnSp>
+      <p:cxnSp>
+        <p:nvCxnSpPr>
+          <p:cNvPr id="42" name="Straight Connector 41">
+            <a:extLst>
+              <a:ext uri="{FF2B5EF4-FFF2-40B4-BE49-F238E27FC236}">
+                <a16:creationId xmlns:a16="http://schemas.microsoft.com/office/drawing/2014/main" id="{C6A6D904-001E-441D-97C1-70FD5FD029FD}"/>
+              </a:ext>
+            </a:extLst>
+          </p:cNvPr>
+          <p:cNvCxnSpPr>
+            <a:cxnSpLocks/>
+          </p:cNvCxnSpPr>
+          <p:nvPr/>
+        </p:nvCxnSpPr>
+        <p:spPr>
+          <a:xfrm>
+            <a:off x="3058315" y="6363478"/>
+            <a:ext cx="655018" cy="0"/>
+          </a:xfrm>
+          <a:prstGeom prst="line">
+            <a:avLst/>
+          </a:prstGeom>
+          <a:ln w="28575">
+            <a:solidFill>
+              <a:schemeClr val="tx1"/>
+            </a:solidFill>
+            <a:prstDash val="sysDot"/>
+          </a:ln>
+        </p:spPr>
+        <p:style>
+          <a:lnRef idx="1">
+            <a:schemeClr val="accent1"/>
+          </a:lnRef>
+          <a:fillRef idx="0">
+            <a:schemeClr val="accent1"/>
+          </a:fillRef>
+          <a:effectRef idx="0">
+            <a:schemeClr val="accent1"/>
+          </a:effectRef>
+          <a:fontRef idx="minor">
+            <a:schemeClr val="tx1"/>
+          </a:fontRef>
+        </p:style>
+      </p:cxnSp>
+      <p:pic>
+        <p:nvPicPr>
+          <p:cNvPr id="2" name="Picture 1">
+            <a:extLst>
+              <a:ext uri="{FF2B5EF4-FFF2-40B4-BE49-F238E27FC236}">
+                <a16:creationId xmlns:a16="http://schemas.microsoft.com/office/drawing/2014/main" id="{3C402FE0-1C00-4D8E-A89B-98C696308883}"/>
+              </a:ext>
+            </a:extLst>
+          </p:cNvPr>
+          <p:cNvPicPr>
+            <a:picLocks noChangeAspect="1"/>
+          </p:cNvPicPr>
+          <p:nvPr/>
+        </p:nvPicPr>
+        <p:blipFill>
+          <a:blip r:embed="rId4"/>
+          <a:stretch>
+            <a:fillRect/>
+          </a:stretch>
+        </p:blipFill>
+        <p:spPr>
+          <a:xfrm>
+            <a:off x="10001957" y="1384268"/>
+            <a:ext cx="933450" cy="209550"/>
+          </a:xfrm>
+          <a:prstGeom prst="rect">
+            <a:avLst/>
+          </a:prstGeom>
+        </p:spPr>
+      </p:pic>
     </p:spTree>
     <p:extLst>
       <p:ext uri="{BB962C8B-B14F-4D97-AF65-F5344CB8AC3E}">

</xml_diff>